<commit_message>
Fix pptx erd background color
</commit_message>
<xml_diff>
--- a/ppt/Oracle DB Project.pptx
+++ b/ppt/Oracle DB Project.pptx
@@ -13053,10 +13053,10 @@
       </p:sp>
       <p:pic>
         <p:nvPicPr>
-          <p:cNvPr id="7" name="Content Placeholder 6" descr="A screenshot of a web browser&#10;&#10;AI-generated content may be incorrect.">
+          <p:cNvPr id="6" name="Content Placeholder 5" descr="A group of white boxes with text&#10;&#10;AI-generated content may be incorrect.">
             <a:extLst>
               <a:ext uri="{FF2B5EF4-FFF2-40B4-BE49-F238E27FC236}">
-                <a16:creationId xmlns:a16="http://schemas.microsoft.com/office/drawing/2014/main" id="{DF5B8EAC-E480-EA54-F8DF-83D8A792B555}"/>
+                <a16:creationId xmlns:a16="http://schemas.microsoft.com/office/drawing/2014/main" id="{D734E91E-FA94-A0F4-82B3-FACAD1463C7B}"/>
               </a:ext>
             </a:extLst>
           </p:cNvPr>
@@ -13075,8 +13075,8 @@
         </p:blipFill>
         <p:spPr>
           <a:xfrm>
-            <a:off x="838200" y="2404796"/>
-            <a:ext cx="10515600" cy="3192995"/>
+            <a:off x="838200" y="1994186"/>
+            <a:ext cx="10515600" cy="4014216"/>
           </a:xfrm>
         </p:spPr>
       </p:pic>

</xml_diff>

<commit_message>
Fix typo in pptx
</commit_message>
<xml_diff>
--- a/ppt/Oracle DB Project.pptx
+++ b/ppt/Oracle DB Project.pptx
@@ -3447,6 +3447,38 @@
           </a:p>
         </p:txBody>
       </p:sp>
+      <p:sp>
+        <p:nvSpPr>
+          <p:cNvPr id="4" name="TextBox 3">
+            <a:extLst>
+              <a:ext uri="{FF2B5EF4-FFF2-40B4-BE49-F238E27FC236}">
+                <a16:creationId xmlns:a16="http://schemas.microsoft.com/office/drawing/2014/main" id="{98200770-8AEF-DA71-B605-07375017A17C}"/>
+              </a:ext>
+            </a:extLst>
+          </p:cNvPr>
+          <p:cNvSpPr txBox="1"/>
+          <p:nvPr/>
+        </p:nvSpPr>
+        <p:spPr>
+          <a:xfrm>
+            <a:off x="7145383" y="3879669"/>
+            <a:ext cx="184731" cy="369332"/>
+          </a:xfrm>
+          <a:prstGeom prst="rect">
+            <a:avLst/>
+          </a:prstGeom>
+          <a:noFill/>
+        </p:spPr>
+        <p:txBody>
+          <a:bodyPr wrap="none" rtlCol="0">
+            <a:spAutoFit/>
+          </a:bodyPr>
+          <a:lstStyle/>
+          <a:p>
+            <a:endParaRPr lang="en-KR" dirty="0"/>
+          </a:p>
+        </p:txBody>
+      </p:sp>
     </p:spTree>
     <p:extLst>
       <p:ext uri="{BB962C8B-B14F-4D97-AF65-F5344CB8AC3E}">
@@ -9638,10 +9670,19 @@
                 <a:solidFill>
                   <a:srgbClr val="000000"/>
                 </a:solidFill>
-                <a:effectLst/>
-                <a:latin typeface="Menlo" panose="020B0609030804020204" pitchFamily="49" charset="0"/>
-              </a:rPr>
-              <a:t>생일을 입력하세요</a:t>
+                <a:latin typeface="Menlo" panose="020B0609030804020204" pitchFamily="49" charset="0"/>
+              </a:rPr>
+              <a:t>시간</a:t>
+            </a:r>
+            <a:r>
+              <a:rPr lang="ko-KR" altLang="en-US" sz="1800" dirty="0">
+                <a:solidFill>
+                  <a:srgbClr val="000000"/>
+                </a:solidFill>
+                <a:effectLst/>
+                <a:latin typeface="Menlo" panose="020B0609030804020204" pitchFamily="49" charset="0"/>
+              </a:rPr>
+              <a:t>을 입력하세요</a:t>
             </a:r>
             <a:r>
               <a:rPr lang="en-US" altLang="ko-KR" sz="1800" dirty="0">

</xml_diff>